<commit_message>
Modified the examples of ROC and PR curves
</commit_message>
<xml_diff>
--- a/chapter_03/figures/curve_roc_pr_examples.pptx
+++ b/chapter_03/figures/curve_roc_pr_examples.pptx
@@ -125,12 +125,12 @@
   <pc:docChgLst>
     <pc:chgData name="Fatima Pillosu" userId="a6295d4dc9e22643" providerId="LiveId" clId="{A85227F6-E635-4722-9CBB-B087EA71400C}"/>
     <pc:docChg chg="undo custSel modSld">
-      <pc:chgData name="Fatima Pillosu" userId="a6295d4dc9e22643" providerId="LiveId" clId="{A85227F6-E635-4722-9CBB-B087EA71400C}" dt="2025-06-27T04:12:12.499" v="3649" actId="165"/>
+      <pc:chgData name="Fatima Pillosu" userId="a6295d4dc9e22643" providerId="LiveId" clId="{A85227F6-E635-4722-9CBB-B087EA71400C}" dt="2025-06-27T04:33:02.058" v="3702" actId="20577"/>
       <pc:docMkLst>
         <pc:docMk/>
       </pc:docMkLst>
       <pc:sldChg chg="addSp delSp modSp mod">
-        <pc:chgData name="Fatima Pillosu" userId="a6295d4dc9e22643" providerId="LiveId" clId="{A85227F6-E635-4722-9CBB-B087EA71400C}" dt="2025-06-27T04:12:12.499" v="3649" actId="165"/>
+        <pc:chgData name="Fatima Pillosu" userId="a6295d4dc9e22643" providerId="LiveId" clId="{A85227F6-E635-4722-9CBB-B087EA71400C}" dt="2025-06-27T04:33:02.058" v="3702" actId="20577"/>
         <pc:sldMkLst>
           <pc:docMk/>
           <pc:sldMk cId="1573992039" sldId="256"/>
@@ -6016,7 +6016,7 @@
           </ac:spMkLst>
         </pc:spChg>
         <pc:spChg chg="add mod">
-          <ac:chgData name="Fatima Pillosu" userId="a6295d4dc9e22643" providerId="LiveId" clId="{A85227F6-E635-4722-9CBB-B087EA71400C}" dt="2025-06-26T14:23:10.413" v="3520" actId="115"/>
+          <ac:chgData name="Fatima Pillosu" userId="a6295d4dc9e22643" providerId="LiveId" clId="{A85227F6-E635-4722-9CBB-B087EA71400C}" dt="2025-06-27T04:33:02.058" v="3702" actId="20577"/>
           <ac:spMkLst>
             <pc:docMk/>
             <pc:sldMk cId="1573992039" sldId="256"/>
@@ -15675,10 +15675,10 @@
                 <a:latin typeface="Calibri Light" panose="020F0302020204030204" pitchFamily="34" charset="0"/>
                 <a:cs typeface="Calibri Light" panose="020F0302020204030204" pitchFamily="34" charset="0"/>
               </a:rPr>
-              <a:t>Their </a:t>
+              <a:t>Computation from contingency tables and performance characteristics under balanced and </a:t>
             </a:r>
             <a:r>
-              <a:rPr lang="en-US" sz="1000" u="sng" dirty="0">
+              <a:rPr lang="en-US" sz="1000">
                 <a:solidFill>
                   <a:schemeClr val="tx1">
                     <a:lumMod val="95000"/>
@@ -15688,47 +15688,18 @@
                 <a:latin typeface="Calibri Light" panose="020F0302020204030204" pitchFamily="34" charset="0"/>
                 <a:cs typeface="Calibri Light" panose="020F0302020204030204" pitchFamily="34" charset="0"/>
               </a:rPr>
-              <a:t>computation</a:t>
+              <a:t>imbalanced datasets</a:t>
             </a:r>
-            <a:r>
-              <a:rPr lang="en-US" sz="1000" dirty="0">
-                <a:solidFill>
-                  <a:schemeClr val="tx1">
-                    <a:lumMod val="95000"/>
-                    <a:lumOff val="5000"/>
-                  </a:schemeClr>
-                </a:solidFill>
-                <a:latin typeface="Calibri Light" panose="020F0302020204030204" pitchFamily="34" charset="0"/>
-                <a:cs typeface="Calibri Light" panose="020F0302020204030204" pitchFamily="34" charset="0"/>
-              </a:rPr>
-              <a:t> from the contingency table and </a:t>
-            </a:r>
-            <a:r>
-              <a:rPr lang="en-US" sz="1000" u="sng" dirty="0">
-                <a:solidFill>
-                  <a:schemeClr val="tx1">
-                    <a:lumMod val="95000"/>
-                    <a:lumOff val="5000"/>
-                  </a:schemeClr>
-                </a:solidFill>
-                <a:latin typeface="Calibri Light" panose="020F0302020204030204" pitchFamily="34" charset="0"/>
-                <a:cs typeface="Calibri Light" panose="020F0302020204030204" pitchFamily="34" charset="0"/>
-              </a:rPr>
-              <a:t>shape</a:t>
-            </a:r>
-            <a:r>
-              <a:rPr lang="en-US" sz="1000" dirty="0">
-                <a:solidFill>
-                  <a:schemeClr val="tx1">
-                    <a:lumMod val="95000"/>
-                    <a:lumOff val="5000"/>
-                  </a:schemeClr>
-                </a:solidFill>
-                <a:latin typeface="Calibri Light" panose="020F0302020204030204" pitchFamily="34" charset="0"/>
-                <a:cs typeface="Calibri Light" panose="020F0302020204030204" pitchFamily="34" charset="0"/>
-              </a:rPr>
-              <a:t> when evaluating data-driven models trained with balanced and imbalanced training datasets</a:t>
-            </a:r>
+            <a:endParaRPr lang="en-US" sz="1000" dirty="0">
+              <a:solidFill>
+                <a:schemeClr val="tx1">
+                  <a:lumMod val="95000"/>
+                  <a:lumOff val="5000"/>
+                </a:schemeClr>
+              </a:solidFill>
+              <a:latin typeface="Calibri Light" panose="020F0302020204030204" pitchFamily="34" charset="0"/>
+              <a:cs typeface="Calibri Light" panose="020F0302020204030204" pitchFamily="34" charset="0"/>
+            </a:endParaRPr>
           </a:p>
         </p:txBody>
       </p:sp>

</xml_diff>

<commit_message>
Improved the figure with examplkes for ROC and PR curves
</commit_message>
<xml_diff>
--- a/chapter_03/figures/curve_roc_pr_examples.pptx
+++ b/chapter_03/figures/curve_roc_pr_examples.pptx
@@ -125,12 +125,12 @@
   <pc:docChgLst>
     <pc:chgData name="Fatima Pillosu" userId="a6295d4dc9e22643" providerId="LiveId" clId="{A85227F6-E635-4722-9CBB-B087EA71400C}"/>
     <pc:docChg chg="undo custSel modSld">
-      <pc:chgData name="Fatima Pillosu" userId="a6295d4dc9e22643" providerId="LiveId" clId="{A85227F6-E635-4722-9CBB-B087EA71400C}" dt="2025-06-27T04:33:02.058" v="3702" actId="20577"/>
+      <pc:chgData name="Fatima Pillosu" userId="a6295d4dc9e22643" providerId="LiveId" clId="{A85227F6-E635-4722-9CBB-B087EA71400C}" dt="2025-06-27T05:30:50.242" v="3704" actId="20577"/>
       <pc:docMkLst>
         <pc:docMk/>
       </pc:docMkLst>
       <pc:sldChg chg="addSp delSp modSp mod">
-        <pc:chgData name="Fatima Pillosu" userId="a6295d4dc9e22643" providerId="LiveId" clId="{A85227F6-E635-4722-9CBB-B087EA71400C}" dt="2025-06-27T04:33:02.058" v="3702" actId="20577"/>
+        <pc:chgData name="Fatima Pillosu" userId="a6295d4dc9e22643" providerId="LiveId" clId="{A85227F6-E635-4722-9CBB-B087EA71400C}" dt="2025-06-27T05:30:50.242" v="3704" actId="20577"/>
         <pc:sldMkLst>
           <pc:docMk/>
           <pc:sldMk cId="1573992039" sldId="256"/>
@@ -6600,7 +6600,7 @@
           </ac:spMkLst>
         </pc:spChg>
         <pc:spChg chg="add mod">
-          <ac:chgData name="Fatima Pillosu" userId="a6295d4dc9e22643" providerId="LiveId" clId="{A85227F6-E635-4722-9CBB-B087EA71400C}" dt="2025-06-26T12:03:02.507" v="2922" actId="20577"/>
+          <ac:chgData name="Fatima Pillosu" userId="a6295d4dc9e22643" providerId="LiveId" clId="{A85227F6-E635-4722-9CBB-B087EA71400C}" dt="2025-06-27T05:30:50.242" v="3704" actId="20577"/>
           <ac:spMkLst>
             <pc:docMk/>
             <pc:sldMk cId="1573992039" sldId="256"/>
@@ -27811,7 +27811,33 @@
                 <a:latin typeface="Calibri Light" panose="020F0302020204030204" pitchFamily="34" charset="0"/>
                 <a:cs typeface="Calibri Light" panose="020F0302020204030204" pitchFamily="34" charset="0"/>
               </a:rPr>
-              <a:t>b) ROC curves: class-balanced discrimination ability (better for balanced datasets)</a:t>
+              <a:t>b) ROC curves</a:t>
+            </a:r>
+            <a:r>
+              <a:rPr lang="en-US" sz="800">
+                <a:solidFill>
+                  <a:schemeClr val="tx1">
+                    <a:lumMod val="95000"/>
+                    <a:lumOff val="5000"/>
+                  </a:schemeClr>
+                </a:solidFill>
+                <a:latin typeface="Calibri Light" panose="020F0302020204030204" pitchFamily="34" charset="0"/>
+                <a:cs typeface="Calibri Light" panose="020F0302020204030204" pitchFamily="34" charset="0"/>
+              </a:rPr>
+              <a:t>: (class-balanced) </a:t>
+            </a:r>
+            <a:r>
+              <a:rPr lang="en-US" sz="800" dirty="0">
+                <a:solidFill>
+                  <a:schemeClr val="tx1">
+                    <a:lumMod val="95000"/>
+                    <a:lumOff val="5000"/>
+                  </a:schemeClr>
+                </a:solidFill>
+                <a:latin typeface="Calibri Light" panose="020F0302020204030204" pitchFamily="34" charset="0"/>
+                <a:cs typeface="Calibri Light" panose="020F0302020204030204" pitchFamily="34" charset="0"/>
+              </a:rPr>
+              <a:t>discrimination ability (better for balanced datasets)</a:t>
             </a:r>
           </a:p>
         </p:txBody>

</xml_diff>